<commit_message>
Implemented CbCr subsampling in JpegProcessor.cs
</commit_message>
<xml_diff>
--- a/HW.pptx
+++ b/HW.pptx
@@ -305,7 +305,7 @@
           <a:p>
             <a:fld id="{1C1022C4-76E6-4BA6-ABC4-727E4EE81408}" type="datetimeFigureOut">
               <a:rPr lang="ru-RU" smtClean="0"/>
-              <a:t>17.03.2023</a:t>
+              <a:t>18.03.2023</a:t>
             </a:fld>
             <a:endParaRPr lang="ru-RU"/>
           </a:p>
@@ -503,7 +503,7 @@
           <a:p>
             <a:fld id="{1C1022C4-76E6-4BA6-ABC4-727E4EE81408}" type="datetimeFigureOut">
               <a:rPr lang="ru-RU" smtClean="0"/>
-              <a:t>17.03.2023</a:t>
+              <a:t>18.03.2023</a:t>
             </a:fld>
             <a:endParaRPr lang="ru-RU"/>
           </a:p>
@@ -711,7 +711,7 @@
           <a:p>
             <a:fld id="{1C1022C4-76E6-4BA6-ABC4-727E4EE81408}" type="datetimeFigureOut">
               <a:rPr lang="ru-RU" smtClean="0"/>
-              <a:t>17.03.2023</a:t>
+              <a:t>18.03.2023</a:t>
             </a:fld>
             <a:endParaRPr lang="ru-RU"/>
           </a:p>
@@ -909,7 +909,7 @@
           <a:p>
             <a:fld id="{1C1022C4-76E6-4BA6-ABC4-727E4EE81408}" type="datetimeFigureOut">
               <a:rPr lang="ru-RU" smtClean="0"/>
-              <a:t>17.03.2023</a:t>
+              <a:t>18.03.2023</a:t>
             </a:fld>
             <a:endParaRPr lang="ru-RU"/>
           </a:p>
@@ -1184,7 +1184,7 @@
           <a:p>
             <a:fld id="{1C1022C4-76E6-4BA6-ABC4-727E4EE81408}" type="datetimeFigureOut">
               <a:rPr lang="ru-RU" smtClean="0"/>
-              <a:t>17.03.2023</a:t>
+              <a:t>18.03.2023</a:t>
             </a:fld>
             <a:endParaRPr lang="ru-RU"/>
           </a:p>
@@ -1449,7 +1449,7 @@
           <a:p>
             <a:fld id="{1C1022C4-76E6-4BA6-ABC4-727E4EE81408}" type="datetimeFigureOut">
               <a:rPr lang="ru-RU" smtClean="0"/>
-              <a:t>17.03.2023</a:t>
+              <a:t>18.03.2023</a:t>
             </a:fld>
             <a:endParaRPr lang="ru-RU"/>
           </a:p>
@@ -1861,7 +1861,7 @@
           <a:p>
             <a:fld id="{1C1022C4-76E6-4BA6-ABC4-727E4EE81408}" type="datetimeFigureOut">
               <a:rPr lang="ru-RU" smtClean="0"/>
-              <a:t>17.03.2023</a:t>
+              <a:t>18.03.2023</a:t>
             </a:fld>
             <a:endParaRPr lang="ru-RU"/>
           </a:p>
@@ -2002,7 +2002,7 @@
           <a:p>
             <a:fld id="{1C1022C4-76E6-4BA6-ABC4-727E4EE81408}" type="datetimeFigureOut">
               <a:rPr lang="ru-RU" smtClean="0"/>
-              <a:t>17.03.2023</a:t>
+              <a:t>18.03.2023</a:t>
             </a:fld>
             <a:endParaRPr lang="ru-RU"/>
           </a:p>
@@ -2115,7 +2115,7 @@
           <a:p>
             <a:fld id="{1C1022C4-76E6-4BA6-ABC4-727E4EE81408}" type="datetimeFigureOut">
               <a:rPr lang="ru-RU" smtClean="0"/>
-              <a:t>17.03.2023</a:t>
+              <a:t>18.03.2023</a:t>
             </a:fld>
             <a:endParaRPr lang="ru-RU"/>
           </a:p>
@@ -2426,7 +2426,7 @@
           <a:p>
             <a:fld id="{1C1022C4-76E6-4BA6-ABC4-727E4EE81408}" type="datetimeFigureOut">
               <a:rPr lang="ru-RU" smtClean="0"/>
-              <a:t>17.03.2023</a:t>
+              <a:t>18.03.2023</a:t>
             </a:fld>
             <a:endParaRPr lang="ru-RU"/>
           </a:p>
@@ -2714,7 +2714,7 @@
           <a:p>
             <a:fld id="{1C1022C4-76E6-4BA6-ABC4-727E4EE81408}" type="datetimeFigureOut">
               <a:rPr lang="ru-RU" smtClean="0"/>
-              <a:t>17.03.2023</a:t>
+              <a:t>18.03.2023</a:t>
             </a:fld>
             <a:endParaRPr lang="ru-RU"/>
           </a:p>
@@ -2955,7 +2955,7 @@
           <a:p>
             <a:fld id="{1C1022C4-76E6-4BA6-ABC4-727E4EE81408}" type="datetimeFigureOut">
               <a:rPr lang="ru-RU" smtClean="0"/>
-              <a:t>17.03.2023</a:t>
+              <a:t>18.03.2023</a:t>
             </a:fld>
             <a:endParaRPr lang="ru-RU"/>
           </a:p>
@@ -8768,6 +8768,18 @@
           <a:lstStyle/>
           <a:p>
             <a:pPr algn="ctr"/>
+            <a:r>
+              <a:rPr lang="ru-RU" sz="2400" dirty="0"/>
+              <a:t>Шаг 17. </a:t>
+            </a:r>
+            <a:r>
+              <a:rPr lang="en-US" sz="2400" dirty="0" err="1"/>
+              <a:t>CbCr</a:t>
+            </a:r>
+            <a:r>
+              <a:rPr lang="en-US" sz="2400" dirty="0"/>
+              <a:t> Subsampling</a:t>
+            </a:r>
             <a:endParaRPr lang="ru-RU" sz="2400" dirty="0"/>
           </a:p>
         </p:txBody>

</xml_diff>

<commit_message>
Refactored CbCr subsampling in JpegProcessor.cs
</commit_message>
<xml_diff>
--- a/HW.pptx
+++ b/HW.pptx
@@ -8877,36 +8877,125 @@
           </a:p>
         </p:txBody>
       </p:sp>
-      <p:sp>
-        <p:nvSpPr>
-          <p:cNvPr id="3" name="Объект 2">
-            <a:extLst>
-              <a:ext uri="{FF2B5EF4-FFF2-40B4-BE49-F238E27FC236}">
-                <a16:creationId xmlns:a16="http://schemas.microsoft.com/office/drawing/2014/main" id="{12294C9C-8BBA-4B61-9FF8-6E7B3F73D293}"/>
-              </a:ext>
-            </a:extLst>
-          </p:cNvPr>
-          <p:cNvSpPr>
-            <a:spLocks noGrp="1"/>
-          </p:cNvSpPr>
+      <p:pic>
+        <p:nvPicPr>
+          <p:cNvPr id="5" name="Объект 4">
+            <a:extLst>
+              <a:ext uri="{FF2B5EF4-FFF2-40B4-BE49-F238E27FC236}">
+                <a16:creationId xmlns:a16="http://schemas.microsoft.com/office/drawing/2014/main" id="{24A2D29D-1382-42BB-825A-8E523FFCDBF4}"/>
+              </a:ext>
+            </a:extLst>
+          </p:cNvPr>
+          <p:cNvPicPr>
+            <a:picLocks noGrp="1" noChangeAspect="1"/>
+          </p:cNvPicPr>
           <p:nvPr>
             <p:ph idx="1"/>
           </p:nvPr>
-        </p:nvSpPr>
-        <p:spPr>
-          <a:xfrm>
-            <a:off x="-1" y="800101"/>
-            <a:ext cx="12191999" cy="6057898"/>
-          </a:xfrm>
-        </p:spPr>
-        <p:txBody>
-          <a:bodyPr/>
-          <a:lstStyle/>
-          <a:p>
-            <a:endParaRPr lang="ru-RU" dirty="0"/>
-          </a:p>
-        </p:txBody>
-      </p:sp>
+        </p:nvPicPr>
+        <p:blipFill>
+          <a:blip r:embed="rId2"/>
+          <a:stretch>
+            <a:fillRect/>
+          </a:stretch>
+        </p:blipFill>
+        <p:spPr>
+          <a:xfrm>
+            <a:off x="1792224" y="1634437"/>
+            <a:ext cx="8779001" cy="1226926"/>
+          </a:xfrm>
+        </p:spPr>
+      </p:pic>
+      <p:pic>
+        <p:nvPicPr>
+          <p:cNvPr id="13" name="Рисунок 12">
+            <a:extLst>
+              <a:ext uri="{FF2B5EF4-FFF2-40B4-BE49-F238E27FC236}">
+                <a16:creationId xmlns:a16="http://schemas.microsoft.com/office/drawing/2014/main" id="{CC9C1086-609E-456A-A88C-8B3CA8DA36AC}"/>
+              </a:ext>
+            </a:extLst>
+          </p:cNvPr>
+          <p:cNvPicPr>
+            <a:picLocks noChangeAspect="1"/>
+          </p:cNvPicPr>
+          <p:nvPr/>
+        </p:nvPicPr>
+        <p:blipFill>
+          <a:blip r:embed="rId3"/>
+          <a:stretch>
+            <a:fillRect/>
+          </a:stretch>
+        </p:blipFill>
+        <p:spPr>
+          <a:xfrm>
+            <a:off x="1744603" y="3274432"/>
+            <a:ext cx="8702794" cy="1226926"/>
+          </a:xfrm>
+          <a:prstGeom prst="rect">
+            <a:avLst/>
+          </a:prstGeom>
+        </p:spPr>
+      </p:pic>
+      <p:pic>
+        <p:nvPicPr>
+          <p:cNvPr id="15" name="Рисунок 14">
+            <a:extLst>
+              <a:ext uri="{FF2B5EF4-FFF2-40B4-BE49-F238E27FC236}">
+                <a16:creationId xmlns:a16="http://schemas.microsoft.com/office/drawing/2014/main" id="{C5C39D03-F85C-4B4F-B54F-B52323E99BB0}"/>
+              </a:ext>
+            </a:extLst>
+          </p:cNvPr>
+          <p:cNvPicPr>
+            <a:picLocks noChangeAspect="1"/>
+          </p:cNvPicPr>
+          <p:nvPr/>
+        </p:nvPicPr>
+        <p:blipFill>
+          <a:blip r:embed="rId4"/>
+          <a:stretch>
+            <a:fillRect/>
+          </a:stretch>
+        </p:blipFill>
+        <p:spPr>
+          <a:xfrm>
+            <a:off x="1759844" y="4640582"/>
+            <a:ext cx="8672312" cy="1165961"/>
+          </a:xfrm>
+          <a:prstGeom prst="rect">
+            <a:avLst/>
+          </a:prstGeom>
+        </p:spPr>
+      </p:pic>
+      <p:pic>
+        <p:nvPicPr>
+          <p:cNvPr id="17" name="Рисунок 16">
+            <a:extLst>
+              <a:ext uri="{FF2B5EF4-FFF2-40B4-BE49-F238E27FC236}">
+                <a16:creationId xmlns:a16="http://schemas.microsoft.com/office/drawing/2014/main" id="{B6E9BB17-061B-475B-95D5-4EA76C686929}"/>
+              </a:ext>
+            </a:extLst>
+          </p:cNvPr>
+          <p:cNvPicPr>
+            <a:picLocks noChangeAspect="1"/>
+          </p:cNvPicPr>
+          <p:nvPr/>
+        </p:nvPicPr>
+        <p:blipFill>
+          <a:blip r:embed="rId5"/>
+          <a:stretch>
+            <a:fillRect/>
+          </a:stretch>
+        </p:blipFill>
+        <p:spPr>
+          <a:xfrm>
+            <a:off x="1735068" y="5945767"/>
+            <a:ext cx="8893311" cy="1188823"/>
+          </a:xfrm>
+          <a:prstGeom prst="rect">
+            <a:avLst/>
+          </a:prstGeom>
+        </p:spPr>
+      </p:pic>
     </p:spTree>
     <p:extLst>
       <p:ext uri="{BB962C8B-B14F-4D97-AF65-F5344CB8AC3E}">

</xml_diff>